<commit_message>
Finish Dennard Scaling lecture.
</commit_message>
<xml_diff>
--- a/Lectures/Dennard Scaling/Dennard Scaling.pptx
+++ b/Lectures/Dennard Scaling/Dennard Scaling.pptx
@@ -5,7 +5,7 @@
     <p:sldMasterId id="2147483660" r:id="rId1"/>
   </p:sldMasterIdLst>
   <p:notesMasterIdLst>
-    <p:notesMasterId r:id="rId7"/>
+    <p:notesMasterId r:id="rId13"/>
   </p:notesMasterIdLst>
   <p:sldIdLst>
     <p:sldId id="256" r:id="rId2"/>
@@ -13,6 +13,12 @@
     <p:sldId id="257" r:id="rId4"/>
     <p:sldId id="259" r:id="rId5"/>
     <p:sldId id="260" r:id="rId6"/>
+    <p:sldId id="261" r:id="rId7"/>
+    <p:sldId id="262" r:id="rId8"/>
+    <p:sldId id="263" r:id="rId9"/>
+    <p:sldId id="264" r:id="rId10"/>
+    <p:sldId id="265" r:id="rId11"/>
+    <p:sldId id="266" r:id="rId12"/>
   </p:sldIdLst>
   <p:sldSz cx="9144000" cy="6858000" type="screen4x3"/>
   <p:notesSz cx="6858000" cy="9144000"/>
@@ -196,7 +202,7 @@
           <a:p>
             <a:fld id="{DBE0ECA1-3FBF-48AE-AD2A-4439AE745E19}" type="datetimeFigureOut">
               <a:rPr lang="en-US" smtClean="0"/>
-              <a:t>10/23/2013</a:t>
+              <a:t>10/25/2013</a:t>
             </a:fld>
             <a:endParaRPr lang="en-US"/>
           </a:p>
@@ -741,7 +747,7 @@
           <a:p>
             <a:fld id="{9769DED8-28D4-45B9-A00F-7CFE9335FEA6}" type="datetime1">
               <a:rPr lang="en-US" smtClean="0"/>
-              <a:t>10/23/2013</a:t>
+              <a:t>10/25/2013</a:t>
             </a:fld>
             <a:endParaRPr lang="en-US"/>
           </a:p>
@@ -1006,7 +1012,7 @@
           <a:p>
             <a:fld id="{2DB3D439-1F88-44B4-B5F7-F9BCD4064257}" type="datetime1">
               <a:rPr lang="en-US" smtClean="0"/>
-              <a:t>10/23/2013</a:t>
+              <a:t>10/25/2013</a:t>
             </a:fld>
             <a:endParaRPr lang="en-US"/>
           </a:p>
@@ -1181,7 +1187,7 @@
           <a:p>
             <a:fld id="{99C5638F-6F55-4055-935C-67841BE78C36}" type="datetime1">
               <a:rPr lang="en-US" smtClean="0"/>
-              <a:t>10/23/2013</a:t>
+              <a:t>10/25/2013</a:t>
             </a:fld>
             <a:endParaRPr lang="en-US"/>
           </a:p>
@@ -1346,7 +1352,7 @@
           <a:p>
             <a:fld id="{E6987D90-0C92-4B22-A29D-FED15412CED2}" type="datetime1">
               <a:rPr lang="en-US" smtClean="0"/>
-              <a:t>10/23/2013</a:t>
+              <a:t>10/25/2013</a:t>
             </a:fld>
             <a:endParaRPr lang="en-US"/>
           </a:p>
@@ -1595,7 +1601,7 @@
           <a:p>
             <a:fld id="{DDB67BC4-9554-49E0-BCB3-D1EF965BA0B8}" type="datetime1">
               <a:rPr lang="en-US" smtClean="0"/>
-              <a:t>10/23/2013</a:t>
+              <a:t>10/25/2013</a:t>
             </a:fld>
             <a:endParaRPr lang="en-US"/>
           </a:p>
@@ -1878,7 +1884,7 @@
           <a:p>
             <a:fld id="{EC24D770-803D-4E01-921C-9C100DD8230C}" type="datetime1">
               <a:rPr lang="en-US" smtClean="0"/>
-              <a:t>10/23/2013</a:t>
+              <a:t>10/25/2013</a:t>
             </a:fld>
             <a:endParaRPr lang="en-US"/>
           </a:p>
@@ -2317,7 +2323,7 @@
           <a:p>
             <a:fld id="{356AD44B-78A4-4209-8070-7DCBE2DC4992}" type="datetime1">
               <a:rPr lang="en-US" smtClean="0"/>
-              <a:t>10/23/2013</a:t>
+              <a:t>10/25/2013</a:t>
             </a:fld>
             <a:endParaRPr lang="en-US"/>
           </a:p>
@@ -2430,7 +2436,7 @@
           <a:p>
             <a:fld id="{A993C59A-7CA2-467F-B7F1-9096881A01B8}" type="datetime1">
               <a:rPr lang="en-US" smtClean="0"/>
-              <a:t>10/23/2013</a:t>
+              <a:t>10/25/2013</a:t>
             </a:fld>
             <a:endParaRPr lang="en-US"/>
           </a:p>
@@ -2520,7 +2526,7 @@
           <a:p>
             <a:fld id="{2B6B58D0-2488-434A-8ED1-692E09B85CC5}" type="datetime1">
               <a:rPr lang="en-US" smtClean="0"/>
-              <a:t>10/23/2013</a:t>
+              <a:t>10/25/2013</a:t>
             </a:fld>
             <a:endParaRPr lang="en-US"/>
           </a:p>
@@ -2762,7 +2768,7 @@
           <a:p>
             <a:fld id="{FDB0AFC2-7D64-4F61-A7B7-9932D3305DDA}" type="datetime1">
               <a:rPr lang="en-US" smtClean="0"/>
-              <a:t>10/23/2013</a:t>
+              <a:t>10/25/2013</a:t>
             </a:fld>
             <a:endParaRPr lang="en-US"/>
           </a:p>
@@ -3056,7 +3062,7 @@
           <a:p>
             <a:fld id="{4983D17A-D7B2-4ECE-8A2C-93679B9D177B}" type="datetime1">
               <a:rPr lang="en-US" smtClean="0"/>
-              <a:t>10/23/2013</a:t>
+              <a:t>10/25/2013</a:t>
             </a:fld>
             <a:endParaRPr lang="en-US"/>
           </a:p>
@@ -3350,7 +3356,7 @@
           <a:p>
             <a:fld id="{2A5275F7-419E-4C23-8A3D-2EE5742B2EC9}" type="datetime1">
               <a:rPr lang="en-US" smtClean="0"/>
-              <a:t>10/23/2013</a:t>
+              <a:t>10/25/2013</a:t>
             </a:fld>
             <a:endParaRPr lang="en-US"/>
           </a:p>
@@ -3880,11 +3886,7 @@
           <a:p>
             <a:r>
               <a:rPr lang="en-US" dirty="0" smtClean="0"/>
-              <a:t>Why the future wil</a:t>
-            </a:r>
-            <a:r>
-              <a:rPr lang="en-US" dirty="0" smtClean="0"/>
-              <a:t>l be different</a:t>
+              <a:t>Why the future will be different</a:t>
             </a:r>
             <a:endParaRPr lang="en-US" dirty="0"/>
           </a:p>
@@ -3933,6 +3935,630 @@
       </p:par>
     </p:tnLst>
   </p:timing>
+</p:sld>
+</file>
+
+<file path=ppt/slides/slide10.xml><?xml version="1.0" encoding="utf-8"?>
+<p:sld xmlns:a="http://schemas.openxmlformats.org/drawingml/2006/main" xmlns:r="http://schemas.openxmlformats.org/officeDocument/2006/relationships" xmlns:p="http://schemas.openxmlformats.org/presentationml/2006/main">
+  <p:cSld>
+    <p:spTree>
+      <p:nvGrpSpPr>
+        <p:cNvPr id="1" name=""/>
+        <p:cNvGrpSpPr/>
+        <p:nvPr/>
+      </p:nvGrpSpPr>
+      <p:grpSpPr>
+        <a:xfrm>
+          <a:off x="0" y="0"/>
+          <a:ext cx="0" cy="0"/>
+          <a:chOff x="0" y="0"/>
+          <a:chExt cx="0" cy="0"/>
+        </a:xfrm>
+      </p:grpSpPr>
+      <p:sp>
+        <p:nvSpPr>
+          <p:cNvPr id="2" name="Title 1"/>
+          <p:cNvSpPr>
+            <a:spLocks noGrp="1"/>
+          </p:cNvSpPr>
+          <p:nvPr>
+            <p:ph type="title"/>
+          </p:nvPr>
+        </p:nvSpPr>
+        <p:spPr/>
+        <p:txBody>
+          <a:bodyPr>
+            <a:normAutofit fontScale="90000"/>
+          </a:bodyPr>
+          <a:lstStyle/>
+          <a:p>
+            <a:r>
+              <a:rPr lang="en-US" dirty="0" smtClean="0"/>
+              <a:t>Hardware Solutions: Lower Power</a:t>
+            </a:r>
+            <a:endParaRPr lang="en-US" dirty="0"/>
+          </a:p>
+        </p:txBody>
+      </p:sp>
+      <p:sp>
+        <p:nvSpPr>
+          <p:cNvPr id="3" name="Content Placeholder 2"/>
+          <p:cNvSpPr>
+            <a:spLocks noGrp="1"/>
+          </p:cNvSpPr>
+          <p:nvPr>
+            <p:ph idx="1"/>
+          </p:nvPr>
+        </p:nvSpPr>
+        <p:spPr/>
+        <p:txBody>
+          <a:bodyPr/>
+          <a:lstStyle/>
+          <a:p>
+            <a:r>
+              <a:rPr lang="en-US" dirty="0" smtClean="0"/>
+              <a:t>Power has become the leading optimization factor in two important places</a:t>
+            </a:r>
+          </a:p>
+          <a:p>
+            <a:pPr marL="800100" lvl="1" indent="-342900"/>
+            <a:r>
+              <a:rPr lang="en-US" dirty="0" smtClean="0"/>
+              <a:t>The data center – due to large scale</a:t>
+            </a:r>
+          </a:p>
+          <a:p>
+            <a:pPr marL="800100" lvl="1" indent="-342900"/>
+            <a:r>
+              <a:rPr lang="en-US" dirty="0" smtClean="0"/>
+              <a:t>Mobile devices – due to batteries</a:t>
+            </a:r>
+          </a:p>
+          <a:p>
+            <a:pPr marL="342900" indent="-342900"/>
+            <a:r>
+              <a:rPr lang="en-US" dirty="0" smtClean="0"/>
+              <a:t>Options for power optimization</a:t>
+            </a:r>
+          </a:p>
+          <a:p>
+            <a:pPr marL="800100" lvl="1" indent="-342900"/>
+            <a:r>
+              <a:rPr lang="en-US" dirty="0" smtClean="0"/>
+              <a:t>Turn off transistors when they are not used to eliminate loss due to leakage current</a:t>
+            </a:r>
+          </a:p>
+          <a:p>
+            <a:pPr marL="800100" lvl="1" indent="-342900"/>
+            <a:r>
+              <a:rPr lang="en-US" dirty="0" smtClean="0"/>
+              <a:t>Lower V</a:t>
+            </a:r>
+            <a:r>
+              <a:rPr lang="en-US" baseline="-25000" dirty="0" smtClean="0"/>
+              <a:t>DD</a:t>
+            </a:r>
+          </a:p>
+          <a:p>
+            <a:pPr marL="800100" lvl="1" indent="-342900"/>
+            <a:r>
+              <a:rPr lang="en-US" dirty="0" smtClean="0"/>
+              <a:t>Optimize power and performance together</a:t>
+            </a:r>
+            <a:endParaRPr lang="en-US" dirty="0"/>
+          </a:p>
+        </p:txBody>
+      </p:sp>
+      <p:sp>
+        <p:nvSpPr>
+          <p:cNvPr id="4" name="Slide Number Placeholder 3"/>
+          <p:cNvSpPr>
+            <a:spLocks noGrp="1"/>
+          </p:cNvSpPr>
+          <p:nvPr>
+            <p:ph type="sldNum" sz="quarter" idx="12"/>
+          </p:nvPr>
+        </p:nvSpPr>
+        <p:spPr/>
+        <p:txBody>
+          <a:bodyPr/>
+          <a:lstStyle/>
+          <a:p>
+            <a:fld id="{6DA12B36-9664-4CB0-8B2E-F4A2F44AE97E}" type="slidenum">
+              <a:rPr lang="en-US" smtClean="0"/>
+              <a:t>10</a:t>
+            </a:fld>
+            <a:endParaRPr lang="en-US"/>
+          </a:p>
+        </p:txBody>
+      </p:sp>
+      <p:sp>
+        <p:nvSpPr>
+          <p:cNvPr id="5" name="Footer Placeholder 4"/>
+          <p:cNvSpPr>
+            <a:spLocks noGrp="1"/>
+          </p:cNvSpPr>
+          <p:nvPr>
+            <p:ph type="ftr" sz="quarter" idx="11"/>
+          </p:nvPr>
+        </p:nvSpPr>
+        <p:spPr/>
+        <p:txBody>
+          <a:bodyPr/>
+          <a:lstStyle/>
+          <a:p>
+            <a:r>
+              <a:rPr lang="en-US" dirty="0"/>
+              <a:t>Source: </a:t>
+            </a:r>
+            <a:r>
+              <a:rPr lang="en-US" dirty="0">
+                <a:hlinkClick r:id="rId2"/>
+              </a:rPr>
+              <a:t>Rob </a:t>
+            </a:r>
+            <a:r>
+              <a:rPr lang="en-US" dirty="0" err="1">
+                <a:hlinkClick r:id="rId2"/>
+              </a:rPr>
+              <a:t>Rutenbar</a:t>
+            </a:r>
+            <a:endParaRPr lang="en-US" dirty="0"/>
+          </a:p>
+          <a:p>
+            <a:endParaRPr lang="en-US" dirty="0"/>
+          </a:p>
+        </p:txBody>
+      </p:sp>
+    </p:spTree>
+    <p:extLst>
+      <p:ext uri="{BB962C8B-B14F-4D97-AF65-F5344CB8AC3E}">
+        <p14:creationId xmlns:p14="http://schemas.microsoft.com/office/powerpoint/2010/main" val="423534114"/>
+      </p:ext>
+    </p:extLst>
+  </p:cSld>
+  <p:clrMapOvr>
+    <a:masterClrMapping/>
+  </p:clrMapOvr>
+</p:sld>
+</file>
+
+<file path=ppt/slides/slide11.xml><?xml version="1.0" encoding="utf-8"?>
+<p:sld xmlns:a="http://schemas.openxmlformats.org/drawingml/2006/main" xmlns:r="http://schemas.openxmlformats.org/officeDocument/2006/relationships" xmlns:p="http://schemas.openxmlformats.org/presentationml/2006/main">
+  <p:cSld>
+    <p:spTree>
+      <p:nvGrpSpPr>
+        <p:cNvPr id="1" name=""/>
+        <p:cNvGrpSpPr/>
+        <p:nvPr/>
+      </p:nvGrpSpPr>
+      <p:grpSpPr>
+        <a:xfrm>
+          <a:off x="0" y="0"/>
+          <a:ext cx="0" cy="0"/>
+          <a:chOff x="0" y="0"/>
+          <a:chExt cx="0" cy="0"/>
+        </a:xfrm>
+      </p:grpSpPr>
+      <p:sp>
+        <p:nvSpPr>
+          <p:cNvPr id="2" name="Title 1"/>
+          <p:cNvSpPr>
+            <a:spLocks noGrp="1"/>
+          </p:cNvSpPr>
+          <p:nvPr>
+            <p:ph type="title"/>
+          </p:nvPr>
+        </p:nvSpPr>
+        <p:spPr/>
+        <p:txBody>
+          <a:bodyPr>
+            <a:normAutofit fontScale="90000"/>
+          </a:bodyPr>
+          <a:lstStyle/>
+          <a:p>
+            <a:r>
+              <a:rPr lang="en-US" dirty="0" smtClean="0"/>
+              <a:t>What does all of this mean for software?</a:t>
+            </a:r>
+            <a:endParaRPr lang="en-US" dirty="0"/>
+          </a:p>
+        </p:txBody>
+      </p:sp>
+      <p:sp>
+        <p:nvSpPr>
+          <p:cNvPr id="3" name="Content Placeholder 2"/>
+          <p:cNvSpPr>
+            <a:spLocks noGrp="1"/>
+          </p:cNvSpPr>
+          <p:nvPr>
+            <p:ph idx="1"/>
+          </p:nvPr>
+        </p:nvSpPr>
+        <p:spPr/>
+        <p:txBody>
+          <a:bodyPr/>
+          <a:lstStyle/>
+          <a:p>
+            <a:r>
+              <a:rPr lang="en-US" dirty="0" smtClean="0"/>
+              <a:t>Three key conclusions (or maybe guesses)</a:t>
+            </a:r>
+            <a:endParaRPr lang="en-US" dirty="0"/>
+          </a:p>
+        </p:txBody>
+      </p:sp>
+      <p:sp>
+        <p:nvSpPr>
+          <p:cNvPr id="4" name="Slide Number Placeholder 3"/>
+          <p:cNvSpPr>
+            <a:spLocks noGrp="1"/>
+          </p:cNvSpPr>
+          <p:nvPr>
+            <p:ph type="sldNum" sz="quarter" idx="12"/>
+          </p:nvPr>
+        </p:nvSpPr>
+        <p:spPr/>
+        <p:txBody>
+          <a:bodyPr/>
+          <a:lstStyle/>
+          <a:p>
+            <a:fld id="{6DA12B36-9664-4CB0-8B2E-F4A2F44AE97E}" type="slidenum">
+              <a:rPr lang="en-US" smtClean="0"/>
+              <a:t>11</a:t>
+            </a:fld>
+            <a:endParaRPr lang="en-US"/>
+          </a:p>
+        </p:txBody>
+      </p:sp>
+      <p:sp>
+        <p:nvSpPr>
+          <p:cNvPr id="5" name="TextBox 4"/>
+          <p:cNvSpPr txBox="1"/>
+          <p:nvPr/>
+        </p:nvSpPr>
+        <p:spPr>
+          <a:xfrm>
+            <a:off x="1295400" y="2590800"/>
+            <a:ext cx="2286000" cy="1200329"/>
+          </a:xfrm>
+          <a:prstGeom prst="rect">
+            <a:avLst/>
+          </a:prstGeom>
+          <a:noFill/>
+        </p:spPr>
+        <p:txBody>
+          <a:bodyPr wrap="square" rtlCol="0">
+            <a:spAutoFit/>
+          </a:bodyPr>
+          <a:lstStyle/>
+          <a:p>
+            <a:pPr algn="ctr"/>
+            <a:r>
+              <a:rPr lang="en-US" dirty="0" smtClean="0"/>
+              <a:t>End of transistor delay scaling</a:t>
+            </a:r>
+          </a:p>
+          <a:p>
+            <a:pPr algn="ctr"/>
+            <a:r>
+              <a:rPr lang="en-US" dirty="0" smtClean="0"/>
+              <a:t>+</a:t>
+            </a:r>
+          </a:p>
+          <a:p>
+            <a:pPr algn="ctr"/>
+            <a:r>
+              <a:rPr lang="en-US" dirty="0" smtClean="0"/>
+              <a:t>Moore’s Law</a:t>
+            </a:r>
+            <a:endParaRPr lang="en-US" dirty="0"/>
+          </a:p>
+        </p:txBody>
+      </p:sp>
+      <p:sp>
+        <p:nvSpPr>
+          <p:cNvPr id="6" name="Right Arrow 5"/>
+          <p:cNvSpPr/>
+          <p:nvPr/>
+        </p:nvSpPr>
+        <p:spPr>
+          <a:xfrm>
+            <a:off x="3810000" y="2819400"/>
+            <a:ext cx="1143000" cy="533400"/>
+          </a:xfrm>
+          <a:prstGeom prst="rightArrow">
+            <a:avLst/>
+          </a:prstGeom>
+        </p:spPr>
+        <p:style>
+          <a:lnRef idx="2">
+            <a:schemeClr val="accent1">
+              <a:shade val="50000"/>
+            </a:schemeClr>
+          </a:lnRef>
+          <a:fillRef idx="1">
+            <a:schemeClr val="accent1"/>
+          </a:fillRef>
+          <a:effectRef idx="0">
+            <a:schemeClr val="accent1"/>
+          </a:effectRef>
+          <a:fontRef idx="minor">
+            <a:schemeClr val="lt1"/>
+          </a:fontRef>
+        </p:style>
+        <p:txBody>
+          <a:bodyPr rtlCol="0" anchor="ctr"/>
+          <a:lstStyle/>
+          <a:p>
+            <a:pPr algn="ctr"/>
+            <a:endParaRPr lang="en-US"/>
+          </a:p>
+        </p:txBody>
+      </p:sp>
+      <p:sp>
+        <p:nvSpPr>
+          <p:cNvPr id="7" name="TextBox 6"/>
+          <p:cNvSpPr txBox="1"/>
+          <p:nvPr/>
+        </p:nvSpPr>
+        <p:spPr>
+          <a:xfrm>
+            <a:off x="5257800" y="2590800"/>
+            <a:ext cx="2057400" cy="923330"/>
+          </a:xfrm>
+          <a:prstGeom prst="rect">
+            <a:avLst/>
+          </a:prstGeom>
+          <a:noFill/>
+        </p:spPr>
+        <p:txBody>
+          <a:bodyPr wrap="square" rtlCol="0">
+            <a:spAutoFit/>
+          </a:bodyPr>
+          <a:lstStyle/>
+          <a:p>
+            <a:pPr algn="ctr"/>
+            <a:r>
+              <a:rPr lang="en-US" dirty="0" smtClean="0"/>
+              <a:t>More CPUs and increased parallel capability</a:t>
+            </a:r>
+            <a:endParaRPr lang="en-US" dirty="0"/>
+          </a:p>
+        </p:txBody>
+      </p:sp>
+      <p:sp>
+        <p:nvSpPr>
+          <p:cNvPr id="8" name="TextBox 7"/>
+          <p:cNvSpPr txBox="1"/>
+          <p:nvPr/>
+        </p:nvSpPr>
+        <p:spPr>
+          <a:xfrm>
+            <a:off x="1295400" y="4057471"/>
+            <a:ext cx="2286000" cy="923330"/>
+          </a:xfrm>
+          <a:prstGeom prst="rect">
+            <a:avLst/>
+          </a:prstGeom>
+          <a:noFill/>
+        </p:spPr>
+        <p:txBody>
+          <a:bodyPr wrap="square" rtlCol="0">
+            <a:spAutoFit/>
+          </a:bodyPr>
+          <a:lstStyle/>
+          <a:p>
+            <a:pPr algn="ctr"/>
+            <a:r>
+              <a:rPr lang="en-US" dirty="0" smtClean="0"/>
+              <a:t>Power vs. Performance Optimization</a:t>
+            </a:r>
+            <a:endParaRPr lang="en-US" dirty="0"/>
+          </a:p>
+        </p:txBody>
+      </p:sp>
+      <p:sp>
+        <p:nvSpPr>
+          <p:cNvPr id="9" name="Right Arrow 8"/>
+          <p:cNvSpPr/>
+          <p:nvPr/>
+        </p:nvSpPr>
+        <p:spPr>
+          <a:xfrm>
+            <a:off x="3810000" y="4286071"/>
+            <a:ext cx="1143000" cy="533400"/>
+          </a:xfrm>
+          <a:prstGeom prst="rightArrow">
+            <a:avLst/>
+          </a:prstGeom>
+        </p:spPr>
+        <p:style>
+          <a:lnRef idx="2">
+            <a:schemeClr val="accent1">
+              <a:shade val="50000"/>
+            </a:schemeClr>
+          </a:lnRef>
+          <a:fillRef idx="1">
+            <a:schemeClr val="accent1"/>
+          </a:fillRef>
+          <a:effectRef idx="0">
+            <a:schemeClr val="accent1"/>
+          </a:effectRef>
+          <a:fontRef idx="minor">
+            <a:schemeClr val="lt1"/>
+          </a:fontRef>
+        </p:style>
+        <p:txBody>
+          <a:bodyPr rtlCol="0" anchor="ctr"/>
+          <a:lstStyle/>
+          <a:p>
+            <a:pPr algn="ctr"/>
+            <a:endParaRPr lang="en-US"/>
+          </a:p>
+        </p:txBody>
+      </p:sp>
+      <p:sp>
+        <p:nvSpPr>
+          <p:cNvPr id="10" name="TextBox 9"/>
+          <p:cNvSpPr txBox="1"/>
+          <p:nvPr/>
+        </p:nvSpPr>
+        <p:spPr>
+          <a:xfrm>
+            <a:off x="5257800" y="3981271"/>
+            <a:ext cx="2286000" cy="1200329"/>
+          </a:xfrm>
+          <a:prstGeom prst="rect">
+            <a:avLst/>
+          </a:prstGeom>
+          <a:noFill/>
+        </p:spPr>
+        <p:txBody>
+          <a:bodyPr wrap="square" rtlCol="0">
+            <a:spAutoFit/>
+          </a:bodyPr>
+          <a:lstStyle/>
+          <a:p>
+            <a:pPr algn="ctr"/>
+            <a:r>
+              <a:rPr lang="en-US" dirty="0" smtClean="0"/>
+              <a:t>Heterogeneous hardware:</a:t>
+            </a:r>
+          </a:p>
+          <a:p>
+            <a:pPr algn="ctr"/>
+            <a:r>
+              <a:rPr lang="en-US" dirty="0" smtClean="0"/>
+              <a:t>Fast and expensive</a:t>
+            </a:r>
+          </a:p>
+          <a:p>
+            <a:pPr algn="ctr"/>
+            <a:r>
+              <a:rPr lang="en-US" dirty="0" smtClean="0"/>
+              <a:t>Slow and cheap</a:t>
+            </a:r>
+            <a:endParaRPr lang="en-US" dirty="0"/>
+          </a:p>
+        </p:txBody>
+      </p:sp>
+      <p:sp>
+        <p:nvSpPr>
+          <p:cNvPr id="11" name="TextBox 10"/>
+          <p:cNvSpPr txBox="1"/>
+          <p:nvPr/>
+        </p:nvSpPr>
+        <p:spPr>
+          <a:xfrm>
+            <a:off x="1295400" y="5574268"/>
+            <a:ext cx="2286000" cy="369332"/>
+          </a:xfrm>
+          <a:prstGeom prst="rect">
+            <a:avLst/>
+          </a:prstGeom>
+          <a:noFill/>
+        </p:spPr>
+        <p:txBody>
+          <a:bodyPr wrap="square" rtlCol="0">
+            <a:spAutoFit/>
+          </a:bodyPr>
+          <a:lstStyle/>
+          <a:p>
+            <a:pPr algn="ctr"/>
+            <a:r>
+              <a:rPr lang="en-US" dirty="0" smtClean="0"/>
+              <a:t>Lower V</a:t>
+            </a:r>
+            <a:r>
+              <a:rPr lang="en-US" baseline="-25000" dirty="0" smtClean="0"/>
+              <a:t>DD</a:t>
+            </a:r>
+            <a:endParaRPr lang="en-US" baseline="-25000" dirty="0"/>
+          </a:p>
+        </p:txBody>
+      </p:sp>
+      <p:sp>
+        <p:nvSpPr>
+          <p:cNvPr id="12" name="Right Arrow 11"/>
+          <p:cNvSpPr/>
+          <p:nvPr/>
+        </p:nvSpPr>
+        <p:spPr>
+          <a:xfrm>
+            <a:off x="3810000" y="5486400"/>
+            <a:ext cx="1143000" cy="533400"/>
+          </a:xfrm>
+          <a:prstGeom prst="rightArrow">
+            <a:avLst/>
+          </a:prstGeom>
+        </p:spPr>
+        <p:style>
+          <a:lnRef idx="2">
+            <a:schemeClr val="accent1">
+              <a:shade val="50000"/>
+            </a:schemeClr>
+          </a:lnRef>
+          <a:fillRef idx="1">
+            <a:schemeClr val="accent1"/>
+          </a:fillRef>
+          <a:effectRef idx="0">
+            <a:schemeClr val="accent1"/>
+          </a:effectRef>
+          <a:fontRef idx="minor">
+            <a:schemeClr val="lt1"/>
+          </a:fontRef>
+        </p:style>
+        <p:txBody>
+          <a:bodyPr rtlCol="0" anchor="ctr"/>
+          <a:lstStyle/>
+          <a:p>
+            <a:pPr algn="ctr"/>
+            <a:endParaRPr lang="en-US"/>
+          </a:p>
+        </p:txBody>
+      </p:sp>
+      <p:sp>
+        <p:nvSpPr>
+          <p:cNvPr id="13" name="TextBox 12"/>
+          <p:cNvSpPr txBox="1"/>
+          <p:nvPr/>
+        </p:nvSpPr>
+        <p:spPr>
+          <a:xfrm>
+            <a:off x="5257800" y="5574268"/>
+            <a:ext cx="2286000" cy="369332"/>
+          </a:xfrm>
+          <a:prstGeom prst="rect">
+            <a:avLst/>
+          </a:prstGeom>
+          <a:noFill/>
+        </p:spPr>
+        <p:txBody>
+          <a:bodyPr wrap="square" rtlCol="0">
+            <a:spAutoFit/>
+          </a:bodyPr>
+          <a:lstStyle/>
+          <a:p>
+            <a:pPr algn="ctr"/>
+            <a:r>
+              <a:rPr lang="en-US" dirty="0" smtClean="0"/>
+              <a:t>Unreliable results</a:t>
+            </a:r>
+            <a:endParaRPr lang="en-US" dirty="0"/>
+          </a:p>
+        </p:txBody>
+      </p:sp>
+    </p:spTree>
+    <p:extLst>
+      <p:ext uri="{BB962C8B-B14F-4D97-AF65-F5344CB8AC3E}">
+        <p14:creationId xmlns:p14="http://schemas.microsoft.com/office/powerpoint/2010/main" val="431740200"/>
+      </p:ext>
+    </p:extLst>
+  </p:cSld>
+  <p:clrMapOvr>
+    <a:masterClrMapping/>
+  </p:clrMapOvr>
 </p:sld>
 </file>
 
@@ -4262,7 +4888,6 @@
               <a:rPr lang="en-US" sz="2000" dirty="0"/>
               <a:t>higher speed for the same power per unit area.</a:t>
             </a:r>
-            <a:endParaRPr lang="en-US" sz="2000" dirty="0"/>
           </a:p>
         </p:txBody>
       </p:sp>
@@ -4466,47 +5091,6 @@
             <a:endParaRPr lang="en-US" dirty="0"/>
           </a:p>
           <a:p>
-            <a:endParaRPr lang="en-US" dirty="0"/>
-          </a:p>
-        </p:txBody>
-      </p:sp>
-      <p:sp>
-        <p:nvSpPr>
-          <p:cNvPr id="7" name="Rectangle 6"/>
-          <p:cNvSpPr/>
-          <p:nvPr/>
-        </p:nvSpPr>
-        <p:spPr>
-          <a:xfrm>
-            <a:off x="3331917" y="3244334"/>
-            <a:ext cx="2480166" cy="369332"/>
-          </a:xfrm>
-          <a:prstGeom prst="rect">
-            <a:avLst/>
-          </a:prstGeom>
-        </p:spPr>
-        <p:txBody>
-          <a:bodyPr wrap="none">
-            <a:spAutoFit/>
-          </a:bodyPr>
-          <a:lstStyle/>
-          <a:p>
-            <a:r>
-              <a:rPr lang="en-US" dirty="0"/>
-              <a:t>Source: </a:t>
-            </a:r>
-            <a:r>
-              <a:rPr lang="en-US" dirty="0">
-                <a:hlinkClick r:id="rId2"/>
-              </a:rPr>
-              <a:t>Rob </a:t>
-            </a:r>
-            <a:r>
-              <a:rPr lang="en-US" dirty="0" err="1">
-                <a:hlinkClick r:id="rId2"/>
-              </a:rPr>
-              <a:t>Rutenbar</a:t>
-            </a:r>
             <a:endParaRPr lang="en-US" dirty="0"/>
           </a:p>
         </p:txBody>
@@ -5807,10 +6391,1049 @@
           </a:p>
         </p:txBody>
       </p:sp>
+      <p:sp>
+        <p:nvSpPr>
+          <p:cNvPr id="3" name="Footer Placeholder 2"/>
+          <p:cNvSpPr>
+            <a:spLocks noGrp="1"/>
+          </p:cNvSpPr>
+          <p:nvPr>
+            <p:ph type="ftr" sz="quarter" idx="11"/>
+          </p:nvPr>
+        </p:nvSpPr>
+        <p:spPr/>
+        <p:txBody>
+          <a:bodyPr/>
+          <a:lstStyle/>
+          <a:p>
+            <a:r>
+              <a:rPr lang="en-US" dirty="0"/>
+              <a:t>Source: </a:t>
+            </a:r>
+            <a:r>
+              <a:rPr lang="en-US" dirty="0">
+                <a:hlinkClick r:id="rId2"/>
+              </a:rPr>
+              <a:t>Rob </a:t>
+            </a:r>
+            <a:r>
+              <a:rPr lang="en-US" dirty="0" err="1">
+                <a:hlinkClick r:id="rId2"/>
+              </a:rPr>
+              <a:t>Rutenbar</a:t>
+            </a:r>
+            <a:endParaRPr lang="en-US" dirty="0"/>
+          </a:p>
+          <a:p>
+            <a:endParaRPr lang="en-US" dirty="0"/>
+          </a:p>
+        </p:txBody>
+      </p:sp>
     </p:spTree>
     <p:extLst>
       <p:ext uri="{BB962C8B-B14F-4D97-AF65-F5344CB8AC3E}">
         <p14:creationId xmlns:p14="http://schemas.microsoft.com/office/powerpoint/2010/main" val="411220971"/>
+      </p:ext>
+    </p:extLst>
+  </p:cSld>
+  <p:clrMapOvr>
+    <a:masterClrMapping/>
+  </p:clrMapOvr>
+</p:sld>
+</file>
+
+<file path=ppt/slides/slide6.xml><?xml version="1.0" encoding="utf-8"?>
+<p:sld xmlns:a="http://schemas.openxmlformats.org/drawingml/2006/main" xmlns:r="http://schemas.openxmlformats.org/officeDocument/2006/relationships" xmlns:p="http://schemas.openxmlformats.org/presentationml/2006/main">
+  <p:cSld>
+    <p:spTree>
+      <p:nvGrpSpPr>
+        <p:cNvPr id="1" name=""/>
+        <p:cNvGrpSpPr/>
+        <p:nvPr/>
+      </p:nvGrpSpPr>
+      <p:grpSpPr>
+        <a:xfrm>
+          <a:off x="0" y="0"/>
+          <a:ext cx="0" cy="0"/>
+          <a:chOff x="0" y="0"/>
+          <a:chExt cx="0" cy="0"/>
+        </a:xfrm>
+      </p:grpSpPr>
+      <p:sp>
+        <p:nvSpPr>
+          <p:cNvPr id="2" name="Title 1"/>
+          <p:cNvSpPr>
+            <a:spLocks noGrp="1"/>
+          </p:cNvSpPr>
+          <p:nvPr>
+            <p:ph type="title"/>
+          </p:nvPr>
+        </p:nvSpPr>
+        <p:spPr/>
+        <p:txBody>
+          <a:bodyPr/>
+          <a:lstStyle/>
+          <a:p>
+            <a:r>
+              <a:rPr lang="en-US" dirty="0" smtClean="0"/>
+              <a:t>The end of </a:t>
+            </a:r>
+            <a:r>
+              <a:rPr lang="en-US" dirty="0" err="1"/>
+              <a:t>D</a:t>
+            </a:r>
+            <a:r>
+              <a:rPr lang="en-US" dirty="0" err="1" smtClean="0"/>
+              <a:t>ennard</a:t>
+            </a:r>
+            <a:r>
+              <a:rPr lang="en-US" dirty="0" smtClean="0"/>
+              <a:t> scaling</a:t>
+            </a:r>
+            <a:endParaRPr lang="en-US" dirty="0"/>
+          </a:p>
+        </p:txBody>
+      </p:sp>
+      <p:sp>
+        <p:nvSpPr>
+          <p:cNvPr id="4" name="Slide Number Placeholder 3"/>
+          <p:cNvSpPr>
+            <a:spLocks noGrp="1"/>
+          </p:cNvSpPr>
+          <p:nvPr>
+            <p:ph type="sldNum" sz="quarter" idx="12"/>
+          </p:nvPr>
+        </p:nvSpPr>
+        <p:spPr/>
+        <p:txBody>
+          <a:bodyPr/>
+          <a:lstStyle/>
+          <a:p>
+            <a:fld id="{6DA12B36-9664-4CB0-8B2E-F4A2F44AE97E}" type="slidenum">
+              <a:rPr lang="en-US" smtClean="0"/>
+              <a:t>6</a:t>
+            </a:fld>
+            <a:endParaRPr lang="en-US"/>
+          </a:p>
+        </p:txBody>
+      </p:sp>
+      <p:pic>
+        <p:nvPicPr>
+          <p:cNvPr id="5" name="Picture 4" descr="fig1-processor-trends.jpf"/>
+          <p:cNvPicPr>
+            <a:picLocks noChangeAspect="1"/>
+          </p:cNvPicPr>
+          <p:nvPr/>
+        </p:nvPicPr>
+        <p:blipFill>
+          <a:blip r:embed="rId2" cstate="screen">
+            <a:extLst>
+              <a:ext uri="{28A0092B-C50C-407E-A947-70E740481C1C}">
+                <a14:useLocalDpi xmlns:a14="http://schemas.microsoft.com/office/drawing/2010/main"/>
+              </a:ext>
+            </a:extLst>
+          </a:blip>
+          <a:stretch>
+            <a:fillRect/>
+          </a:stretch>
+        </p:blipFill>
+        <p:spPr>
+          <a:xfrm>
+            <a:off x="762000" y="1560174"/>
+            <a:ext cx="7430140" cy="4916826"/>
+          </a:xfrm>
+          <a:prstGeom prst="rect">
+            <a:avLst/>
+          </a:prstGeom>
+        </p:spPr>
+      </p:pic>
+      <p:sp>
+        <p:nvSpPr>
+          <p:cNvPr id="6" name="Footer Placeholder 5"/>
+          <p:cNvSpPr>
+            <a:spLocks noGrp="1"/>
+          </p:cNvSpPr>
+          <p:nvPr>
+            <p:ph type="ftr" sz="quarter" idx="11"/>
+          </p:nvPr>
+        </p:nvSpPr>
+        <p:spPr/>
+        <p:txBody>
+          <a:bodyPr/>
+          <a:lstStyle/>
+          <a:p>
+            <a:r>
+              <a:rPr lang="en-US" dirty="0" smtClean="0"/>
+              <a:t>Source: Bob Lucas</a:t>
+            </a:r>
+            <a:endParaRPr lang="en-US" dirty="0"/>
+          </a:p>
+        </p:txBody>
+      </p:sp>
+    </p:spTree>
+    <p:extLst>
+      <p:ext uri="{BB962C8B-B14F-4D97-AF65-F5344CB8AC3E}">
+        <p14:creationId xmlns:p14="http://schemas.microsoft.com/office/powerpoint/2010/main" val="2152947872"/>
+      </p:ext>
+    </p:extLst>
+  </p:cSld>
+  <p:clrMapOvr>
+    <a:masterClrMapping/>
+  </p:clrMapOvr>
+</p:sld>
+</file>
+
+<file path=ppt/slides/slide7.xml><?xml version="1.0" encoding="utf-8"?>
+<p:sld xmlns:a="http://schemas.openxmlformats.org/drawingml/2006/main" xmlns:r="http://schemas.openxmlformats.org/officeDocument/2006/relationships" xmlns:p="http://schemas.openxmlformats.org/presentationml/2006/main">
+  <p:cSld>
+    <p:spTree>
+      <p:nvGrpSpPr>
+        <p:cNvPr id="1" name=""/>
+        <p:cNvGrpSpPr/>
+        <p:nvPr/>
+      </p:nvGrpSpPr>
+      <p:grpSpPr>
+        <a:xfrm>
+          <a:off x="0" y="0"/>
+          <a:ext cx="0" cy="0"/>
+          <a:chOff x="0" y="0"/>
+          <a:chExt cx="0" cy="0"/>
+        </a:xfrm>
+      </p:grpSpPr>
+      <p:sp>
+        <p:nvSpPr>
+          <p:cNvPr id="2" name="Title 1"/>
+          <p:cNvSpPr>
+            <a:spLocks noGrp="1"/>
+          </p:cNvSpPr>
+          <p:nvPr>
+            <p:ph type="title"/>
+          </p:nvPr>
+        </p:nvSpPr>
+        <p:spPr/>
+        <p:txBody>
+          <a:bodyPr/>
+          <a:lstStyle/>
+          <a:p>
+            <a:r>
+              <a:rPr lang="en-US" dirty="0" smtClean="0"/>
+              <a:t>Why is </a:t>
+            </a:r>
+            <a:r>
+              <a:rPr lang="en-US" dirty="0" err="1" smtClean="0"/>
+              <a:t>Dennard</a:t>
+            </a:r>
+            <a:r>
+              <a:rPr lang="en-US" dirty="0" smtClean="0"/>
+              <a:t> Scaling ending?</a:t>
+            </a:r>
+            <a:endParaRPr lang="en-US" dirty="0"/>
+          </a:p>
+        </p:txBody>
+      </p:sp>
+      <p:sp>
+        <p:nvSpPr>
+          <p:cNvPr id="3" name="Content Placeholder 2"/>
+          <p:cNvSpPr>
+            <a:spLocks noGrp="1"/>
+          </p:cNvSpPr>
+          <p:nvPr>
+            <p:ph idx="1"/>
+          </p:nvPr>
+        </p:nvSpPr>
+        <p:spPr/>
+        <p:txBody>
+          <a:bodyPr/>
+          <a:lstStyle/>
+          <a:p>
+            <a:r>
+              <a:rPr lang="en-US" dirty="0" smtClean="0"/>
+              <a:t>Oxide thickness (</a:t>
+            </a:r>
+            <a:r>
+              <a:rPr lang="en-US" dirty="0" err="1" smtClean="0"/>
+              <a:t>Tox</a:t>
+            </a:r>
+            <a:r>
+              <a:rPr lang="en-US" dirty="0" smtClean="0"/>
+              <a:t>) can only get so small</a:t>
+            </a:r>
+          </a:p>
+          <a:p>
+            <a:pPr marL="800100" lvl="1" indent="-342900"/>
+            <a:r>
+              <a:rPr lang="en-US" dirty="0" smtClean="0"/>
+              <a:t>65 nm – </a:t>
+            </a:r>
+            <a:r>
+              <a:rPr lang="en-US" dirty="0" err="1" smtClean="0"/>
+              <a:t>Tox</a:t>
+            </a:r>
+            <a:r>
+              <a:rPr lang="en-US" dirty="0" smtClean="0"/>
+              <a:t> is 5 atoms thick</a:t>
+            </a:r>
+          </a:p>
+          <a:p>
+            <a:pPr marL="800100" lvl="1" indent="-342900"/>
+            <a:r>
+              <a:rPr lang="en-US" dirty="0" smtClean="0"/>
+              <a:t>Intel has moved from 45 nm, 32 nm, and is now at 22 nm</a:t>
+            </a:r>
+          </a:p>
+          <a:p>
+            <a:pPr marL="800100" lvl="1" indent="-342900"/>
+            <a:r>
+              <a:rPr lang="en-US" dirty="0" smtClean="0"/>
+              <a:t>Scaling is getting more and more difficult</a:t>
+            </a:r>
+          </a:p>
+          <a:p>
+            <a:pPr marL="342900" indent="-342900"/>
+            <a:r>
+              <a:rPr lang="en-US" dirty="0" smtClean="0"/>
+              <a:t>Leakage current is now a problem for power consumption</a:t>
+            </a:r>
+          </a:p>
+        </p:txBody>
+      </p:sp>
+      <p:sp>
+        <p:nvSpPr>
+          <p:cNvPr id="4" name="Slide Number Placeholder 3"/>
+          <p:cNvSpPr>
+            <a:spLocks noGrp="1"/>
+          </p:cNvSpPr>
+          <p:nvPr>
+            <p:ph type="sldNum" sz="quarter" idx="12"/>
+          </p:nvPr>
+        </p:nvSpPr>
+        <p:spPr/>
+        <p:txBody>
+          <a:bodyPr/>
+          <a:lstStyle/>
+          <a:p>
+            <a:fld id="{6DA12B36-9664-4CB0-8B2E-F4A2F44AE97E}" type="slidenum">
+              <a:rPr lang="en-US" smtClean="0"/>
+              <a:t>7</a:t>
+            </a:fld>
+            <a:endParaRPr lang="en-US"/>
+          </a:p>
+        </p:txBody>
+      </p:sp>
+      <p:sp>
+        <p:nvSpPr>
+          <p:cNvPr id="5" name="Rectangle 4"/>
+          <p:cNvSpPr/>
+          <p:nvPr/>
+        </p:nvSpPr>
+        <p:spPr>
+          <a:xfrm>
+            <a:off x="2057400" y="3884023"/>
+            <a:ext cx="3962400" cy="762000"/>
+          </a:xfrm>
+          <a:prstGeom prst="rect">
+            <a:avLst/>
+          </a:prstGeom>
+        </p:spPr>
+        <p:style>
+          <a:lnRef idx="2">
+            <a:schemeClr val="accent1">
+              <a:shade val="50000"/>
+            </a:schemeClr>
+          </a:lnRef>
+          <a:fillRef idx="1">
+            <a:schemeClr val="accent1"/>
+          </a:fillRef>
+          <a:effectRef idx="0">
+            <a:schemeClr val="accent1"/>
+          </a:effectRef>
+          <a:fontRef idx="minor">
+            <a:schemeClr val="lt1"/>
+          </a:fontRef>
+        </p:style>
+        <p:txBody>
+          <a:bodyPr rtlCol="0" anchor="ctr"/>
+          <a:lstStyle/>
+          <a:p>
+            <a:pPr marL="342900" indent="-342900" algn="ctr"/>
+            <a:r>
+              <a:rPr lang="en-US" sz="2000" dirty="0"/>
+              <a:t>Power = C</a:t>
+            </a:r>
+            <a:r>
+              <a:rPr lang="en-US" sz="2000" baseline="-25000" dirty="0"/>
+              <a:t>EFF</a:t>
+            </a:r>
+            <a:r>
+              <a:rPr lang="en-US" sz="2000" dirty="0"/>
+              <a:t> V</a:t>
+            </a:r>
+            <a:r>
+              <a:rPr lang="en-US" sz="2000" baseline="-25000" dirty="0"/>
+              <a:t>DD</a:t>
+            </a:r>
+            <a:r>
+              <a:rPr lang="en-US" sz="2000" baseline="30000" dirty="0"/>
+              <a:t>2 </a:t>
+            </a:r>
+            <a:r>
+              <a:rPr lang="en-US" sz="2000" dirty="0"/>
+              <a:t>f + I</a:t>
+            </a:r>
+            <a:r>
+              <a:rPr lang="en-US" sz="2000" baseline="-25000" dirty="0"/>
+              <a:t>LEAK</a:t>
+            </a:r>
+            <a:r>
+              <a:rPr lang="en-US" sz="2000" dirty="0"/>
+              <a:t> V</a:t>
+            </a:r>
+            <a:r>
+              <a:rPr lang="en-US" sz="2000" baseline="-25000" dirty="0"/>
+              <a:t>DD</a:t>
+            </a:r>
+            <a:endParaRPr lang="en-US" sz="2000" baseline="-25000" dirty="0"/>
+          </a:p>
+        </p:txBody>
+      </p:sp>
+      <p:sp>
+        <p:nvSpPr>
+          <p:cNvPr id="6" name="Down Arrow 5"/>
+          <p:cNvSpPr/>
+          <p:nvPr/>
+        </p:nvSpPr>
+        <p:spPr>
+          <a:xfrm>
+            <a:off x="3429000" y="4495800"/>
+            <a:ext cx="914400" cy="990600"/>
+          </a:xfrm>
+          <a:prstGeom prst="downArrow">
+            <a:avLst/>
+          </a:prstGeom>
+          <a:solidFill>
+            <a:schemeClr val="accent6">
+              <a:lumMod val="50000"/>
+            </a:schemeClr>
+          </a:solidFill>
+        </p:spPr>
+        <p:style>
+          <a:lnRef idx="2">
+            <a:schemeClr val="accent1">
+              <a:shade val="50000"/>
+            </a:schemeClr>
+          </a:lnRef>
+          <a:fillRef idx="1">
+            <a:schemeClr val="accent1"/>
+          </a:fillRef>
+          <a:effectRef idx="0">
+            <a:schemeClr val="accent1"/>
+          </a:effectRef>
+          <a:fontRef idx="minor">
+            <a:schemeClr val="lt1"/>
+          </a:fontRef>
+        </p:style>
+        <p:txBody>
+          <a:bodyPr rtlCol="0" anchor="ctr"/>
+          <a:lstStyle/>
+          <a:p>
+            <a:pPr algn="ctr"/>
+            <a:endParaRPr lang="en-US"/>
+          </a:p>
+        </p:txBody>
+      </p:sp>
+      <p:sp>
+        <p:nvSpPr>
+          <p:cNvPr id="7" name="Down Arrow 6"/>
+          <p:cNvSpPr/>
+          <p:nvPr/>
+        </p:nvSpPr>
+        <p:spPr>
+          <a:xfrm>
+            <a:off x="2209800" y="4495800"/>
+            <a:ext cx="914400" cy="990600"/>
+          </a:xfrm>
+          <a:prstGeom prst="downArrow">
+            <a:avLst/>
+          </a:prstGeom>
+          <a:solidFill>
+            <a:schemeClr val="accent6">
+              <a:lumMod val="50000"/>
+            </a:schemeClr>
+          </a:solidFill>
+        </p:spPr>
+        <p:style>
+          <a:lnRef idx="2">
+            <a:schemeClr val="accent1">
+              <a:shade val="50000"/>
+            </a:schemeClr>
+          </a:lnRef>
+          <a:fillRef idx="1">
+            <a:schemeClr val="accent1"/>
+          </a:fillRef>
+          <a:effectRef idx="0">
+            <a:schemeClr val="accent1"/>
+          </a:effectRef>
+          <a:fontRef idx="minor">
+            <a:schemeClr val="lt1"/>
+          </a:fontRef>
+        </p:style>
+        <p:txBody>
+          <a:bodyPr rtlCol="0" anchor="ctr"/>
+          <a:lstStyle/>
+          <a:p>
+            <a:pPr algn="ctr"/>
+            <a:endParaRPr lang="en-US"/>
+          </a:p>
+        </p:txBody>
+      </p:sp>
+      <p:sp>
+        <p:nvSpPr>
+          <p:cNvPr id="8" name="Rectangle 7"/>
+          <p:cNvSpPr/>
+          <p:nvPr/>
+        </p:nvSpPr>
+        <p:spPr>
+          <a:xfrm>
+            <a:off x="4724400" y="4038600"/>
+            <a:ext cx="1219200" cy="480060"/>
+          </a:xfrm>
+          <a:prstGeom prst="rect">
+            <a:avLst/>
+          </a:prstGeom>
+          <a:noFill/>
+          <a:ln>
+            <a:solidFill>
+              <a:schemeClr val="tx2"/>
+            </a:solidFill>
+          </a:ln>
+        </p:spPr>
+        <p:style>
+          <a:lnRef idx="2">
+            <a:schemeClr val="accent1">
+              <a:shade val="50000"/>
+            </a:schemeClr>
+          </a:lnRef>
+          <a:fillRef idx="1">
+            <a:schemeClr val="accent1"/>
+          </a:fillRef>
+          <a:effectRef idx="0">
+            <a:schemeClr val="accent1"/>
+          </a:effectRef>
+          <a:fontRef idx="minor">
+            <a:schemeClr val="lt1"/>
+          </a:fontRef>
+        </p:style>
+        <p:txBody>
+          <a:bodyPr rtlCol="0" anchor="ctr"/>
+          <a:lstStyle/>
+          <a:p>
+            <a:pPr algn="ctr"/>
+            <a:endParaRPr lang="en-US"/>
+          </a:p>
+        </p:txBody>
+      </p:sp>
+      <p:sp>
+        <p:nvSpPr>
+          <p:cNvPr id="9" name="Footer Placeholder 8"/>
+          <p:cNvSpPr>
+            <a:spLocks noGrp="1"/>
+          </p:cNvSpPr>
+          <p:nvPr>
+            <p:ph type="ftr" sz="quarter" idx="11"/>
+          </p:nvPr>
+        </p:nvSpPr>
+        <p:spPr/>
+        <p:txBody>
+          <a:bodyPr/>
+          <a:lstStyle/>
+          <a:p>
+            <a:r>
+              <a:rPr lang="en-US" dirty="0"/>
+              <a:t>Source: </a:t>
+            </a:r>
+            <a:r>
+              <a:rPr lang="en-US" dirty="0">
+                <a:hlinkClick r:id="rId2"/>
+              </a:rPr>
+              <a:t>Rob </a:t>
+            </a:r>
+            <a:r>
+              <a:rPr lang="en-US" dirty="0" err="1">
+                <a:hlinkClick r:id="rId2"/>
+              </a:rPr>
+              <a:t>Rutenbar</a:t>
+            </a:r>
+            <a:endParaRPr lang="en-US" dirty="0"/>
+          </a:p>
+        </p:txBody>
+      </p:sp>
+    </p:spTree>
+    <p:extLst>
+      <p:ext uri="{BB962C8B-B14F-4D97-AF65-F5344CB8AC3E}">
+        <p14:creationId xmlns:p14="http://schemas.microsoft.com/office/powerpoint/2010/main" val="2431413643"/>
+      </p:ext>
+    </p:extLst>
+  </p:cSld>
+  <p:clrMapOvr>
+    <a:masterClrMapping/>
+  </p:clrMapOvr>
+</p:sld>
+</file>
+
+<file path=ppt/slides/slide8.xml><?xml version="1.0" encoding="utf-8"?>
+<p:sld xmlns:a="http://schemas.openxmlformats.org/drawingml/2006/main" xmlns:r="http://schemas.openxmlformats.org/officeDocument/2006/relationships" xmlns:p="http://schemas.openxmlformats.org/presentationml/2006/main">
+  <p:cSld>
+    <p:spTree>
+      <p:nvGrpSpPr>
+        <p:cNvPr id="1" name=""/>
+        <p:cNvGrpSpPr/>
+        <p:nvPr/>
+      </p:nvGrpSpPr>
+      <p:grpSpPr>
+        <a:xfrm>
+          <a:off x="0" y="0"/>
+          <a:ext cx="0" cy="0"/>
+          <a:chOff x="0" y="0"/>
+          <a:chExt cx="0" cy="0"/>
+        </a:xfrm>
+      </p:grpSpPr>
+      <p:sp>
+        <p:nvSpPr>
+          <p:cNvPr id="2" name="Title 1"/>
+          <p:cNvSpPr>
+            <a:spLocks noGrp="1"/>
+          </p:cNvSpPr>
+          <p:nvPr>
+            <p:ph type="title"/>
+          </p:nvPr>
+        </p:nvSpPr>
+        <p:spPr/>
+        <p:txBody>
+          <a:bodyPr>
+            <a:normAutofit fontScale="90000"/>
+          </a:bodyPr>
+          <a:lstStyle/>
+          <a:p>
+            <a:r>
+              <a:rPr lang="en-US" dirty="0" smtClean="0"/>
+              <a:t>Hardware Solutions: transistor design</a:t>
+            </a:r>
+            <a:endParaRPr lang="en-US" dirty="0"/>
+          </a:p>
+        </p:txBody>
+      </p:sp>
+      <p:sp>
+        <p:nvSpPr>
+          <p:cNvPr id="3" name="Content Placeholder 2"/>
+          <p:cNvSpPr>
+            <a:spLocks noGrp="1"/>
+          </p:cNvSpPr>
+          <p:nvPr>
+            <p:ph idx="1"/>
+          </p:nvPr>
+        </p:nvSpPr>
+        <p:spPr/>
+        <p:txBody>
+          <a:bodyPr/>
+          <a:lstStyle/>
+          <a:p>
+            <a:r>
+              <a:rPr lang="en-US" dirty="0" smtClean="0"/>
+              <a:t>New transistor manufacturing techniques</a:t>
+            </a:r>
+            <a:endParaRPr lang="en-US" dirty="0"/>
+          </a:p>
+        </p:txBody>
+      </p:sp>
+      <p:sp>
+        <p:nvSpPr>
+          <p:cNvPr id="4" name="Slide Number Placeholder 3"/>
+          <p:cNvSpPr>
+            <a:spLocks noGrp="1"/>
+          </p:cNvSpPr>
+          <p:nvPr>
+            <p:ph type="sldNum" sz="quarter" idx="12"/>
+          </p:nvPr>
+        </p:nvSpPr>
+        <p:spPr/>
+        <p:txBody>
+          <a:bodyPr/>
+          <a:lstStyle/>
+          <a:p>
+            <a:fld id="{6DA12B36-9664-4CB0-8B2E-F4A2F44AE97E}" type="slidenum">
+              <a:rPr lang="en-US" smtClean="0"/>
+              <a:t>8</a:t>
+            </a:fld>
+            <a:endParaRPr lang="en-US"/>
+          </a:p>
+        </p:txBody>
+      </p:sp>
+      <p:pic>
+        <p:nvPicPr>
+          <p:cNvPr id="1026" name="Picture 2"/>
+          <p:cNvPicPr>
+            <a:picLocks noChangeAspect="1" noChangeArrowheads="1"/>
+          </p:cNvPicPr>
+          <p:nvPr/>
+        </p:nvPicPr>
+        <p:blipFill>
+          <a:blip r:embed="rId2">
+            <a:extLst>
+              <a:ext uri="{28A0092B-C50C-407E-A947-70E740481C1C}">
+                <a14:useLocalDpi xmlns:a14="http://schemas.microsoft.com/office/drawing/2010/main" val="0"/>
+              </a:ext>
+            </a:extLst>
+          </a:blip>
+          <a:srcRect/>
+          <a:stretch>
+            <a:fillRect/>
+          </a:stretch>
+        </p:blipFill>
+        <p:spPr bwMode="auto">
+          <a:xfrm>
+            <a:off x="685800" y="2398173"/>
+            <a:ext cx="3200400" cy="2228265"/>
+          </a:xfrm>
+          <a:prstGeom prst="rect">
+            <a:avLst/>
+          </a:prstGeom>
+          <a:noFill/>
+          <a:ln>
+            <a:noFill/>
+          </a:ln>
+          <a:extLst>
+            <a:ext uri="{909E8E84-426E-40DD-AFC4-6F175D3DCCD1}">
+              <a14:hiddenFill xmlns:a14="http://schemas.microsoft.com/office/drawing/2010/main">
+                <a:solidFill>
+                  <a:schemeClr val="accent1"/>
+                </a:solidFill>
+              </a14:hiddenFill>
+            </a:ext>
+            <a:ext uri="{91240B29-F687-4F45-9708-019B960494DF}">
+              <a14:hiddenLine xmlns:a14="http://schemas.microsoft.com/office/drawing/2010/main" w="9525">
+                <a:solidFill>
+                  <a:schemeClr val="tx1"/>
+                </a:solidFill>
+                <a:miter lim="800000"/>
+                <a:headEnd/>
+                <a:tailEnd/>
+              </a14:hiddenLine>
+            </a:ext>
+          </a:extLst>
+        </p:spPr>
+      </p:pic>
+      <p:pic>
+        <p:nvPicPr>
+          <p:cNvPr id="1028" name="Picture 4"/>
+          <p:cNvPicPr>
+            <a:picLocks noChangeAspect="1" noChangeArrowheads="1"/>
+          </p:cNvPicPr>
+          <p:nvPr/>
+        </p:nvPicPr>
+        <p:blipFill>
+          <a:blip r:embed="rId3">
+            <a:extLst>
+              <a:ext uri="{28A0092B-C50C-407E-A947-70E740481C1C}">
+                <a14:useLocalDpi xmlns:a14="http://schemas.microsoft.com/office/drawing/2010/main" val="0"/>
+              </a:ext>
+            </a:extLst>
+          </a:blip>
+          <a:srcRect/>
+          <a:stretch>
+            <a:fillRect/>
+          </a:stretch>
+        </p:blipFill>
+        <p:spPr bwMode="auto">
+          <a:xfrm>
+            <a:off x="4648200" y="2376402"/>
+            <a:ext cx="3048000" cy="2352260"/>
+          </a:xfrm>
+          <a:prstGeom prst="rect">
+            <a:avLst/>
+          </a:prstGeom>
+          <a:noFill/>
+          <a:ln>
+            <a:noFill/>
+          </a:ln>
+          <a:extLst>
+            <a:ext uri="{909E8E84-426E-40DD-AFC4-6F175D3DCCD1}">
+              <a14:hiddenFill xmlns:a14="http://schemas.microsoft.com/office/drawing/2010/main">
+                <a:solidFill>
+                  <a:schemeClr val="accent1"/>
+                </a:solidFill>
+              </a14:hiddenFill>
+            </a:ext>
+            <a:ext uri="{91240B29-F687-4F45-9708-019B960494DF}">
+              <a14:hiddenLine xmlns:a14="http://schemas.microsoft.com/office/drawing/2010/main" w="9525">
+                <a:solidFill>
+                  <a:schemeClr val="tx1"/>
+                </a:solidFill>
+                <a:miter lim="800000"/>
+                <a:headEnd/>
+                <a:tailEnd/>
+              </a14:hiddenLine>
+            </a:ext>
+          </a:extLst>
+        </p:spPr>
+      </p:pic>
+      <p:sp>
+        <p:nvSpPr>
+          <p:cNvPr id="5" name="TextBox 4"/>
+          <p:cNvSpPr txBox="1"/>
+          <p:nvPr/>
+        </p:nvSpPr>
+        <p:spPr>
+          <a:xfrm>
+            <a:off x="1143000" y="4728662"/>
+            <a:ext cx="2133600" cy="369332"/>
+          </a:xfrm>
+          <a:prstGeom prst="rect">
+            <a:avLst/>
+          </a:prstGeom>
+          <a:noFill/>
+        </p:spPr>
+        <p:txBody>
+          <a:bodyPr wrap="square" rtlCol="0">
+            <a:spAutoFit/>
+          </a:bodyPr>
+          <a:lstStyle/>
+          <a:p>
+            <a:r>
+              <a:rPr lang="en-US" dirty="0" smtClean="0"/>
+              <a:t>Classic Transistor</a:t>
+            </a:r>
+            <a:endParaRPr lang="en-US" dirty="0"/>
+          </a:p>
+        </p:txBody>
+      </p:sp>
+      <p:sp>
+        <p:nvSpPr>
+          <p:cNvPr id="9" name="TextBox 8"/>
+          <p:cNvSpPr txBox="1"/>
+          <p:nvPr/>
+        </p:nvSpPr>
+        <p:spPr>
+          <a:xfrm>
+            <a:off x="4648200" y="4750341"/>
+            <a:ext cx="2743200" cy="369332"/>
+          </a:xfrm>
+          <a:prstGeom prst="rect">
+            <a:avLst/>
+          </a:prstGeom>
+          <a:noFill/>
+        </p:spPr>
+        <p:txBody>
+          <a:bodyPr wrap="square" rtlCol="0">
+            <a:spAutoFit/>
+          </a:bodyPr>
+          <a:lstStyle/>
+          <a:p>
+            <a:r>
+              <a:rPr lang="en-US" dirty="0" smtClean="0"/>
+              <a:t>Intel’s Tri-Gate Transistor</a:t>
+            </a:r>
+            <a:endParaRPr lang="en-US" dirty="0"/>
+          </a:p>
+        </p:txBody>
+      </p:sp>
+      <p:sp>
+        <p:nvSpPr>
+          <p:cNvPr id="7" name="Footer Placeholder 6"/>
+          <p:cNvSpPr>
+            <a:spLocks noGrp="1"/>
+          </p:cNvSpPr>
+          <p:nvPr>
+            <p:ph type="ftr" sz="quarter" idx="11"/>
+          </p:nvPr>
+        </p:nvSpPr>
+        <p:spPr/>
+        <p:txBody>
+          <a:bodyPr/>
+          <a:lstStyle/>
+          <a:p>
+            <a:r>
+              <a:rPr lang="en-US" dirty="0"/>
+              <a:t>Source: </a:t>
+            </a:r>
+            <a:r>
+              <a:rPr lang="en-US" dirty="0">
+                <a:hlinkClick r:id="rId4"/>
+              </a:rPr>
+              <a:t>Intel</a:t>
+            </a:r>
+            <a:endParaRPr lang="en-US" dirty="0"/>
+          </a:p>
+          <a:p>
+            <a:endParaRPr lang="en-US" dirty="0"/>
+          </a:p>
+        </p:txBody>
+      </p:sp>
+    </p:spTree>
+    <p:extLst>
+      <p:ext uri="{BB962C8B-B14F-4D97-AF65-F5344CB8AC3E}">
+        <p14:creationId xmlns:p14="http://schemas.microsoft.com/office/powerpoint/2010/main" val="4248284145"/>
+      </p:ext>
+    </p:extLst>
+  </p:cSld>
+  <p:clrMapOvr>
+    <a:masterClrMapping/>
+  </p:clrMapOvr>
+</p:sld>
+</file>
+
+<file path=ppt/slides/slide9.xml><?xml version="1.0" encoding="utf-8"?>
+<p:sld xmlns:a="http://schemas.openxmlformats.org/drawingml/2006/main" xmlns:r="http://schemas.openxmlformats.org/officeDocument/2006/relationships" xmlns:p="http://schemas.openxmlformats.org/presentationml/2006/main">
+  <p:cSld>
+    <p:spTree>
+      <p:nvGrpSpPr>
+        <p:cNvPr id="1" name=""/>
+        <p:cNvGrpSpPr/>
+        <p:nvPr/>
+      </p:nvGrpSpPr>
+      <p:grpSpPr>
+        <a:xfrm>
+          <a:off x="0" y="0"/>
+          <a:ext cx="0" cy="0"/>
+          <a:chOff x="0" y="0"/>
+          <a:chExt cx="0" cy="0"/>
+        </a:xfrm>
+      </p:grpSpPr>
+      <p:sp>
+        <p:nvSpPr>
+          <p:cNvPr id="2" name="Title 1"/>
+          <p:cNvSpPr>
+            <a:spLocks noGrp="1"/>
+          </p:cNvSpPr>
+          <p:nvPr>
+            <p:ph type="title"/>
+          </p:nvPr>
+        </p:nvSpPr>
+        <p:spPr/>
+        <p:txBody>
+          <a:bodyPr/>
+          <a:lstStyle/>
+          <a:p>
+            <a:r>
+              <a:rPr lang="en-US" dirty="0" smtClean="0"/>
+              <a:t>Transistor design will continue</a:t>
+            </a:r>
+            <a:endParaRPr lang="en-US" dirty="0"/>
+          </a:p>
+        </p:txBody>
+      </p:sp>
+      <p:sp>
+        <p:nvSpPr>
+          <p:cNvPr id="4" name="Slide Number Placeholder 3"/>
+          <p:cNvSpPr>
+            <a:spLocks noGrp="1"/>
+          </p:cNvSpPr>
+          <p:nvPr>
+            <p:ph type="sldNum" sz="quarter" idx="12"/>
+          </p:nvPr>
+        </p:nvSpPr>
+        <p:spPr/>
+        <p:txBody>
+          <a:bodyPr/>
+          <a:lstStyle/>
+          <a:p>
+            <a:fld id="{6DA12B36-9664-4CB0-8B2E-F4A2F44AE97E}" type="slidenum">
+              <a:rPr lang="en-US" smtClean="0"/>
+              <a:t>9</a:t>
+            </a:fld>
+            <a:endParaRPr lang="en-US"/>
+          </a:p>
+        </p:txBody>
+      </p:sp>
+      <p:pic>
+        <p:nvPicPr>
+          <p:cNvPr id="2050" name="Picture 2"/>
+          <p:cNvPicPr>
+            <a:picLocks noChangeAspect="1" noChangeArrowheads="1"/>
+          </p:cNvPicPr>
+          <p:nvPr/>
+        </p:nvPicPr>
+        <p:blipFill>
+          <a:blip r:embed="rId2">
+            <a:extLst>
+              <a:ext uri="{28A0092B-C50C-407E-A947-70E740481C1C}">
+                <a14:useLocalDpi xmlns:a14="http://schemas.microsoft.com/office/drawing/2010/main" val="0"/>
+              </a:ext>
+            </a:extLst>
+          </a:blip>
+          <a:srcRect/>
+          <a:stretch>
+            <a:fillRect/>
+          </a:stretch>
+        </p:blipFill>
+        <p:spPr bwMode="auto">
+          <a:xfrm>
+            <a:off x="304800" y="1762125"/>
+            <a:ext cx="8210550" cy="3876675"/>
+          </a:xfrm>
+          <a:prstGeom prst="rect">
+            <a:avLst/>
+          </a:prstGeom>
+          <a:noFill/>
+          <a:ln>
+            <a:noFill/>
+          </a:ln>
+          <a:extLst>
+            <a:ext uri="{909E8E84-426E-40DD-AFC4-6F175D3DCCD1}">
+              <a14:hiddenFill xmlns:a14="http://schemas.microsoft.com/office/drawing/2010/main">
+                <a:solidFill>
+                  <a:schemeClr val="accent1"/>
+                </a:solidFill>
+              </a14:hiddenFill>
+            </a:ext>
+            <a:ext uri="{91240B29-F687-4F45-9708-019B960494DF}">
+              <a14:hiddenLine xmlns:a14="http://schemas.microsoft.com/office/drawing/2010/main" w="9525">
+                <a:solidFill>
+                  <a:schemeClr val="tx1"/>
+                </a:solidFill>
+                <a:miter lim="800000"/>
+                <a:headEnd/>
+                <a:tailEnd/>
+              </a14:hiddenLine>
+            </a:ext>
+          </a:extLst>
+        </p:spPr>
+      </p:pic>
+      <p:sp>
+        <p:nvSpPr>
+          <p:cNvPr id="5" name="Footer Placeholder 4"/>
+          <p:cNvSpPr>
+            <a:spLocks noGrp="1"/>
+          </p:cNvSpPr>
+          <p:nvPr>
+            <p:ph type="ftr" sz="quarter" idx="11"/>
+          </p:nvPr>
+        </p:nvSpPr>
+        <p:spPr/>
+        <p:txBody>
+          <a:bodyPr/>
+          <a:lstStyle/>
+          <a:p>
+            <a:r>
+              <a:rPr lang="en-US" dirty="0"/>
+              <a:t>Source: </a:t>
+            </a:r>
+            <a:r>
+              <a:rPr lang="en-US" dirty="0">
+                <a:hlinkClick r:id="rId3"/>
+              </a:rPr>
+              <a:t>Intel</a:t>
+            </a:r>
+            <a:endParaRPr lang="en-US" dirty="0"/>
+          </a:p>
+          <a:p>
+            <a:endParaRPr lang="en-US" dirty="0"/>
+          </a:p>
+        </p:txBody>
+      </p:sp>
+    </p:spTree>
+    <p:extLst>
+      <p:ext uri="{BB962C8B-B14F-4D97-AF65-F5344CB8AC3E}">
+        <p14:creationId xmlns:p14="http://schemas.microsoft.com/office/powerpoint/2010/main" val="1853287133"/>
       </p:ext>
     </p:extLst>
   </p:cSld>

</xml_diff>

<commit_message>
Update Dennard Scaling lecture and add lecture notes.
</commit_message>
<xml_diff>
--- a/Lectures/Dennard Scaling/Dennard Scaling.pptx
+++ b/Lectures/Dennard Scaling/Dennard Scaling.pptx
@@ -202,7 +202,7 @@
           <a:p>
             <a:fld id="{DBE0ECA1-3FBF-48AE-AD2A-4439AE745E19}" type="datetimeFigureOut">
               <a:rPr lang="en-US" smtClean="0"/>
-              <a:t>10/25/2013</a:t>
+              <a:t>1/18/2014</a:t>
             </a:fld>
             <a:endParaRPr lang="en-US"/>
           </a:p>
@@ -747,7 +747,7 @@
           <a:p>
             <a:fld id="{9769DED8-28D4-45B9-A00F-7CFE9335FEA6}" type="datetime1">
               <a:rPr lang="en-US" smtClean="0"/>
-              <a:t>10/25/2013</a:t>
+              <a:t>1/18/2014</a:t>
             </a:fld>
             <a:endParaRPr lang="en-US"/>
           </a:p>
@@ -1012,7 +1012,7 @@
           <a:p>
             <a:fld id="{2DB3D439-1F88-44B4-B5F7-F9BCD4064257}" type="datetime1">
               <a:rPr lang="en-US" smtClean="0"/>
-              <a:t>10/25/2013</a:t>
+              <a:t>1/18/2014</a:t>
             </a:fld>
             <a:endParaRPr lang="en-US"/>
           </a:p>
@@ -1187,7 +1187,7 @@
           <a:p>
             <a:fld id="{99C5638F-6F55-4055-935C-67841BE78C36}" type="datetime1">
               <a:rPr lang="en-US" smtClean="0"/>
-              <a:t>10/25/2013</a:t>
+              <a:t>1/18/2014</a:t>
             </a:fld>
             <a:endParaRPr lang="en-US"/>
           </a:p>
@@ -1352,7 +1352,7 @@
           <a:p>
             <a:fld id="{E6987D90-0C92-4B22-A29D-FED15412CED2}" type="datetime1">
               <a:rPr lang="en-US" smtClean="0"/>
-              <a:t>10/25/2013</a:t>
+              <a:t>1/18/2014</a:t>
             </a:fld>
             <a:endParaRPr lang="en-US"/>
           </a:p>
@@ -1601,7 +1601,7 @@
           <a:p>
             <a:fld id="{DDB67BC4-9554-49E0-BCB3-D1EF965BA0B8}" type="datetime1">
               <a:rPr lang="en-US" smtClean="0"/>
-              <a:t>10/25/2013</a:t>
+              <a:t>1/18/2014</a:t>
             </a:fld>
             <a:endParaRPr lang="en-US"/>
           </a:p>
@@ -1884,7 +1884,7 @@
           <a:p>
             <a:fld id="{EC24D770-803D-4E01-921C-9C100DD8230C}" type="datetime1">
               <a:rPr lang="en-US" smtClean="0"/>
-              <a:t>10/25/2013</a:t>
+              <a:t>1/18/2014</a:t>
             </a:fld>
             <a:endParaRPr lang="en-US"/>
           </a:p>
@@ -2323,7 +2323,7 @@
           <a:p>
             <a:fld id="{356AD44B-78A4-4209-8070-7DCBE2DC4992}" type="datetime1">
               <a:rPr lang="en-US" smtClean="0"/>
-              <a:t>10/25/2013</a:t>
+              <a:t>1/18/2014</a:t>
             </a:fld>
             <a:endParaRPr lang="en-US"/>
           </a:p>
@@ -2436,7 +2436,7 @@
           <a:p>
             <a:fld id="{A993C59A-7CA2-467F-B7F1-9096881A01B8}" type="datetime1">
               <a:rPr lang="en-US" smtClean="0"/>
-              <a:t>10/25/2013</a:t>
+              <a:t>1/18/2014</a:t>
             </a:fld>
             <a:endParaRPr lang="en-US"/>
           </a:p>
@@ -2526,7 +2526,7 @@
           <a:p>
             <a:fld id="{2B6B58D0-2488-434A-8ED1-692E09B85CC5}" type="datetime1">
               <a:rPr lang="en-US" smtClean="0"/>
-              <a:t>10/25/2013</a:t>
+              <a:t>1/18/2014</a:t>
             </a:fld>
             <a:endParaRPr lang="en-US"/>
           </a:p>
@@ -2768,7 +2768,7 @@
           <a:p>
             <a:fld id="{FDB0AFC2-7D64-4F61-A7B7-9932D3305DDA}" type="datetime1">
               <a:rPr lang="en-US" smtClean="0"/>
-              <a:t>10/25/2013</a:t>
+              <a:t>1/18/2014</a:t>
             </a:fld>
             <a:endParaRPr lang="en-US"/>
           </a:p>
@@ -3062,7 +3062,7 @@
           <a:p>
             <a:fld id="{4983D17A-D7B2-4ECE-8A2C-93679B9D177B}" type="datetime1">
               <a:rPr lang="en-US" smtClean="0"/>
-              <a:t>10/25/2013</a:t>
+              <a:t>1/18/2014</a:t>
             </a:fld>
             <a:endParaRPr lang="en-US"/>
           </a:p>
@@ -3356,7 +3356,7 @@
           <a:p>
             <a:fld id="{2A5275F7-419E-4C23-8A3D-2EE5742B2EC9}" type="datetime1">
               <a:rPr lang="en-US" smtClean="0"/>
-              <a:t>10/25/2013</a:t>
+              <a:t>1/18/2014</a:t>
             </a:fld>
             <a:endParaRPr lang="en-US"/>
           </a:p>
@@ -4032,12 +4032,25 @@
             <a:pPr marL="800100" lvl="1" indent="-342900"/>
             <a:r>
               <a:rPr lang="en-US" dirty="0" smtClean="0"/>
-              <a:t>Lower V</a:t>
+              <a:t>Lower </a:t>
+            </a:r>
+            <a:r>
+              <a:rPr lang="en-US" dirty="0" smtClean="0"/>
+              <a:t>V</a:t>
             </a:r>
             <a:r>
               <a:rPr lang="en-US" baseline="-25000" dirty="0" smtClean="0"/>
               <a:t>DD</a:t>
             </a:r>
+            <a:r>
+              <a:rPr lang="en-US" dirty="0"/>
+              <a:t> </a:t>
+            </a:r>
+            <a:r>
+              <a:rPr lang="en-US" dirty="0" smtClean="0"/>
+              <a:t>without decreasing other dimensions</a:t>
+            </a:r>
+            <a:endParaRPr lang="en-US" baseline="-25000" dirty="0" smtClean="0"/>
           </a:p>
           <a:p>
             <a:pPr marL="800100" lvl="1" indent="-342900"/>
@@ -4120,6 +4133,13 @@
   <p:clrMapOvr>
     <a:masterClrMapping/>
   </p:clrMapOvr>
+  <p:timing>
+    <p:tnLst>
+      <p:par>
+        <p:cTn id="1" dur="indefinite" restart="never" nodeType="tmRoot"/>
+      </p:par>
+    </p:tnLst>
+  </p:timing>
 </p:sld>
 </file>
 
@@ -4559,6 +4579,242 @@
   <p:clrMapOvr>
     <a:masterClrMapping/>
   </p:clrMapOvr>
+  <p:timing>
+    <p:tnLst>
+      <p:par>
+        <p:cTn id="1" dur="indefinite" restart="never" nodeType="tmRoot">
+          <p:childTnLst>
+            <p:seq concurrent="1" nextAc="seek">
+              <p:cTn id="2" dur="indefinite" nodeType="mainSeq">
+                <p:childTnLst>
+                  <p:par>
+                    <p:cTn id="3" fill="hold">
+                      <p:stCondLst>
+                        <p:cond delay="indefinite"/>
+                      </p:stCondLst>
+                      <p:childTnLst>
+                        <p:par>
+                          <p:cTn id="4" fill="hold">
+                            <p:stCondLst>
+                              <p:cond delay="0"/>
+                            </p:stCondLst>
+                            <p:childTnLst>
+                              <p:par>
+                                <p:cTn id="5" presetID="1" presetClass="entr" presetSubtype="0" fill="hold" grpId="0" nodeType="clickEffect">
+                                  <p:stCondLst>
+                                    <p:cond delay="0"/>
+                                  </p:stCondLst>
+                                  <p:childTnLst>
+                                    <p:set>
+                                      <p:cBhvr>
+                                        <p:cTn id="6" dur="1" fill="hold">
+                                          <p:stCondLst>
+                                            <p:cond delay="0"/>
+                                          </p:stCondLst>
+                                        </p:cTn>
+                                        <p:tgtEl>
+                                          <p:spTgt spid="8"/>
+                                        </p:tgtEl>
+                                        <p:attrNameLst>
+                                          <p:attrName>style.visibility</p:attrName>
+                                        </p:attrNameLst>
+                                      </p:cBhvr>
+                                      <p:to>
+                                        <p:strVal val="visible"/>
+                                      </p:to>
+                                    </p:set>
+                                  </p:childTnLst>
+                                </p:cTn>
+                              </p:par>
+                              <p:par>
+                                <p:cTn id="7" presetID="1" presetClass="entr" presetSubtype="0" fill="hold" grpId="0" nodeType="withEffect">
+                                  <p:stCondLst>
+                                    <p:cond delay="0"/>
+                                  </p:stCondLst>
+                                  <p:childTnLst>
+                                    <p:set>
+                                      <p:cBhvr>
+                                        <p:cTn id="8" dur="1" fill="hold">
+                                          <p:stCondLst>
+                                            <p:cond delay="0"/>
+                                          </p:stCondLst>
+                                        </p:cTn>
+                                        <p:tgtEl>
+                                          <p:spTgt spid="9"/>
+                                        </p:tgtEl>
+                                        <p:attrNameLst>
+                                          <p:attrName>style.visibility</p:attrName>
+                                        </p:attrNameLst>
+                                      </p:cBhvr>
+                                      <p:to>
+                                        <p:strVal val="visible"/>
+                                      </p:to>
+                                    </p:set>
+                                  </p:childTnLst>
+                                </p:cTn>
+                              </p:par>
+                              <p:par>
+                                <p:cTn id="9" presetID="1" presetClass="entr" presetSubtype="0" fill="hold" grpId="0" nodeType="withEffect">
+                                  <p:stCondLst>
+                                    <p:cond delay="0"/>
+                                  </p:stCondLst>
+                                  <p:childTnLst>
+                                    <p:set>
+                                      <p:cBhvr>
+                                        <p:cTn id="10" dur="1" fill="hold">
+                                          <p:stCondLst>
+                                            <p:cond delay="0"/>
+                                          </p:stCondLst>
+                                        </p:cTn>
+                                        <p:tgtEl>
+                                          <p:spTgt spid="10"/>
+                                        </p:tgtEl>
+                                        <p:attrNameLst>
+                                          <p:attrName>style.visibility</p:attrName>
+                                        </p:attrNameLst>
+                                      </p:cBhvr>
+                                      <p:to>
+                                        <p:strVal val="visible"/>
+                                      </p:to>
+                                    </p:set>
+                                  </p:childTnLst>
+                                </p:cTn>
+                              </p:par>
+                            </p:childTnLst>
+                          </p:cTn>
+                        </p:par>
+                      </p:childTnLst>
+                    </p:cTn>
+                  </p:par>
+                  <p:par>
+                    <p:cTn id="11" fill="hold">
+                      <p:stCondLst>
+                        <p:cond delay="indefinite"/>
+                      </p:stCondLst>
+                      <p:childTnLst>
+                        <p:par>
+                          <p:cTn id="12" fill="hold">
+                            <p:stCondLst>
+                              <p:cond delay="0"/>
+                            </p:stCondLst>
+                            <p:childTnLst>
+                              <p:par>
+                                <p:cTn id="13" presetID="1" presetClass="entr" presetSubtype="0" fill="hold" grpId="0" nodeType="clickEffect">
+                                  <p:stCondLst>
+                                    <p:cond delay="0"/>
+                                  </p:stCondLst>
+                                  <p:childTnLst>
+                                    <p:set>
+                                      <p:cBhvr>
+                                        <p:cTn id="14" dur="1" fill="hold">
+                                          <p:stCondLst>
+                                            <p:cond delay="0"/>
+                                          </p:stCondLst>
+                                        </p:cTn>
+                                        <p:tgtEl>
+                                          <p:spTgt spid="11"/>
+                                        </p:tgtEl>
+                                        <p:attrNameLst>
+                                          <p:attrName>style.visibility</p:attrName>
+                                        </p:attrNameLst>
+                                      </p:cBhvr>
+                                      <p:to>
+                                        <p:strVal val="visible"/>
+                                      </p:to>
+                                    </p:set>
+                                  </p:childTnLst>
+                                </p:cTn>
+                              </p:par>
+                              <p:par>
+                                <p:cTn id="15" presetID="1" presetClass="entr" presetSubtype="0" fill="hold" grpId="0" nodeType="withEffect">
+                                  <p:stCondLst>
+                                    <p:cond delay="0"/>
+                                  </p:stCondLst>
+                                  <p:childTnLst>
+                                    <p:set>
+                                      <p:cBhvr>
+                                        <p:cTn id="16" dur="1" fill="hold">
+                                          <p:stCondLst>
+                                            <p:cond delay="0"/>
+                                          </p:stCondLst>
+                                        </p:cTn>
+                                        <p:tgtEl>
+                                          <p:spTgt spid="12"/>
+                                        </p:tgtEl>
+                                        <p:attrNameLst>
+                                          <p:attrName>style.visibility</p:attrName>
+                                        </p:attrNameLst>
+                                      </p:cBhvr>
+                                      <p:to>
+                                        <p:strVal val="visible"/>
+                                      </p:to>
+                                    </p:set>
+                                  </p:childTnLst>
+                                </p:cTn>
+                              </p:par>
+                              <p:par>
+                                <p:cTn id="17" presetID="1" presetClass="entr" presetSubtype="0" fill="hold" grpId="0" nodeType="withEffect">
+                                  <p:stCondLst>
+                                    <p:cond delay="0"/>
+                                  </p:stCondLst>
+                                  <p:childTnLst>
+                                    <p:set>
+                                      <p:cBhvr>
+                                        <p:cTn id="18" dur="1" fill="hold">
+                                          <p:stCondLst>
+                                            <p:cond delay="0"/>
+                                          </p:stCondLst>
+                                        </p:cTn>
+                                        <p:tgtEl>
+                                          <p:spTgt spid="13"/>
+                                        </p:tgtEl>
+                                        <p:attrNameLst>
+                                          <p:attrName>style.visibility</p:attrName>
+                                        </p:attrNameLst>
+                                      </p:cBhvr>
+                                      <p:to>
+                                        <p:strVal val="visible"/>
+                                      </p:to>
+                                    </p:set>
+                                  </p:childTnLst>
+                                </p:cTn>
+                              </p:par>
+                            </p:childTnLst>
+                          </p:cTn>
+                        </p:par>
+                      </p:childTnLst>
+                    </p:cTn>
+                  </p:par>
+                </p:childTnLst>
+              </p:cTn>
+              <p:prevCondLst>
+                <p:cond evt="onPrev" delay="0">
+                  <p:tgtEl>
+                    <p:sldTgt/>
+                  </p:tgtEl>
+                </p:cond>
+              </p:prevCondLst>
+              <p:nextCondLst>
+                <p:cond evt="onNext" delay="0">
+                  <p:tgtEl>
+                    <p:sldTgt/>
+                  </p:tgtEl>
+                </p:cond>
+              </p:nextCondLst>
+            </p:seq>
+          </p:childTnLst>
+        </p:cTn>
+      </p:par>
+    </p:tnLst>
+    <p:bldLst>
+      <p:bldP spid="8" grpId="0"/>
+      <p:bldP spid="9" grpId="0" animBg="1"/>
+      <p:bldP spid="10" grpId="0"/>
+      <p:bldP spid="11" grpId="0"/>
+      <p:bldP spid="12" grpId="0" animBg="1"/>
+      <p:bldP spid="13" grpId="0"/>
+    </p:bldLst>
+  </p:timing>
 </p:sld>
 </file>
 
@@ -4904,9 +5160,80 @@
   <p:timing>
     <p:tnLst>
       <p:par>
-        <p:cTn id="1" dur="indefinite" restart="never" nodeType="tmRoot"/>
+        <p:cTn id="1" dur="indefinite" restart="never" nodeType="tmRoot">
+          <p:childTnLst>
+            <p:seq concurrent="1" nextAc="seek">
+              <p:cTn id="2" dur="indefinite" nodeType="mainSeq">
+                <p:childTnLst>
+                  <p:par>
+                    <p:cTn id="3" fill="hold">
+                      <p:stCondLst>
+                        <p:cond delay="indefinite"/>
+                      </p:stCondLst>
+                      <p:childTnLst>
+                        <p:par>
+                          <p:cTn id="4" fill="hold">
+                            <p:stCondLst>
+                              <p:cond delay="0"/>
+                            </p:stCondLst>
+                            <p:childTnLst>
+                              <p:par>
+                                <p:cTn id="5" presetID="1" presetClass="entr" presetSubtype="0" fill="hold" grpId="0" nodeType="clickEffect">
+                                  <p:stCondLst>
+                                    <p:cond delay="0"/>
+                                  </p:stCondLst>
+                                  <p:childTnLst>
+                                    <p:set>
+                                      <p:cBhvr>
+                                        <p:cTn id="6" dur="1" fill="hold">
+                                          <p:stCondLst>
+                                            <p:cond delay="0"/>
+                                          </p:stCondLst>
+                                        </p:cTn>
+                                        <p:tgtEl>
+                                          <p:spTgt spid="5"/>
+                                        </p:tgtEl>
+                                        <p:attrNameLst>
+                                          <p:attrName>style.visibility</p:attrName>
+                                        </p:attrNameLst>
+                                      </p:cBhvr>
+                                      <p:to>
+                                        <p:strVal val="visible"/>
+                                      </p:to>
+                                    </p:set>
+                                  </p:childTnLst>
+                                </p:cTn>
+                              </p:par>
+                            </p:childTnLst>
+                          </p:cTn>
+                        </p:par>
+                      </p:childTnLst>
+                    </p:cTn>
+                  </p:par>
+                </p:childTnLst>
+              </p:cTn>
+              <p:prevCondLst>
+                <p:cond evt="onPrev" delay="0">
+                  <p:tgtEl>
+                    <p:sldTgt/>
+                  </p:tgtEl>
+                </p:cond>
+              </p:prevCondLst>
+              <p:nextCondLst>
+                <p:cond evt="onNext" delay="0">
+                  <p:tgtEl>
+                    <p:sldTgt/>
+                  </p:tgtEl>
+                </p:cond>
+              </p:nextCondLst>
+            </p:seq>
+          </p:childTnLst>
+        </p:cTn>
       </p:par>
     </p:tnLst>
+    <p:bldLst>
+      <p:bldP spid="5" grpId="0" animBg="1"/>
+    </p:bldLst>
   </p:timing>
 </p:sld>
 </file>
@@ -5008,8 +5335,13 @@
             <a:pPr marL="800100" lvl="1" indent="-342900"/>
             <a:r>
               <a:rPr lang="en-US" dirty="0" smtClean="0"/>
-              <a:t>Making transistors smaller made them better</a:t>
-            </a:r>
+              <a:t>Making transistors smaller made them </a:t>
+            </a:r>
+            <a:r>
+              <a:rPr lang="en-US" dirty="0" smtClean="0"/>
+              <a:t>better</a:t>
+            </a:r>
+            <a:endParaRPr lang="en-US" dirty="0" smtClean="0"/>
           </a:p>
           <a:p>
             <a:pPr marL="1485900" lvl="2" indent="-342900"/>
@@ -5105,6 +5437,13 @@
   <p:clrMapOvr>
     <a:masterClrMapping/>
   </p:clrMapOvr>
+  <p:timing>
+    <p:tnLst>
+      <p:par>
+        <p:cTn id="1" dur="indefinite" restart="never" nodeType="tmRoot"/>
+      </p:par>
+    </p:tnLst>
+  </p:timing>
 </p:sld>
 </file>
 
@@ -6439,6 +6778,84 @@
   <p:clrMapOvr>
     <a:masterClrMapping/>
   </p:clrMapOvr>
+  <p:timing>
+    <p:tnLst>
+      <p:par>
+        <p:cTn id="1" dur="indefinite" restart="never" nodeType="tmRoot">
+          <p:childTnLst>
+            <p:seq concurrent="1" nextAc="seek">
+              <p:cTn id="2" dur="indefinite" nodeType="mainSeq">
+                <p:childTnLst>
+                  <p:par>
+                    <p:cTn id="3" fill="hold">
+                      <p:stCondLst>
+                        <p:cond delay="indefinite"/>
+                      </p:stCondLst>
+                      <p:childTnLst>
+                        <p:par>
+                          <p:cTn id="4" fill="hold">
+                            <p:stCondLst>
+                              <p:cond delay="0"/>
+                            </p:stCondLst>
+                            <p:childTnLst>
+                              <p:par>
+                                <p:cTn id="5" presetID="1" presetClass="entr" presetSubtype="0" fill="hold" grpId="0" nodeType="clickEffect">
+                                  <p:stCondLst>
+                                    <p:cond delay="0"/>
+                                  </p:stCondLst>
+                                  <p:childTnLst>
+                                    <p:set>
+                                      <p:cBhvr>
+                                        <p:cTn id="6" dur="1" fill="hold">
+                                          <p:stCondLst>
+                                            <p:cond delay="0"/>
+                                          </p:stCondLst>
+                                        </p:cTn>
+                                        <p:tgtEl>
+                                          <p:spTgt spid="31"/>
+                                        </p:tgtEl>
+                                        <p:attrNameLst>
+                                          <p:attrName>style.visibility</p:attrName>
+                                        </p:attrNameLst>
+                                      </p:cBhvr>
+                                      <p:to>
+                                        <p:strVal val="visible"/>
+                                      </p:to>
+                                    </p:set>
+                                  </p:childTnLst>
+                                </p:cTn>
+                              </p:par>
+                            </p:childTnLst>
+                          </p:cTn>
+                        </p:par>
+                      </p:childTnLst>
+                    </p:cTn>
+                  </p:par>
+                </p:childTnLst>
+              </p:cTn>
+              <p:prevCondLst>
+                <p:cond evt="onPrev" delay="0">
+                  <p:tgtEl>
+                    <p:sldTgt/>
+                  </p:tgtEl>
+                </p:cond>
+              </p:prevCondLst>
+              <p:nextCondLst>
+                <p:cond evt="onNext" delay="0">
+                  <p:tgtEl>
+                    <p:sldTgt/>
+                  </p:tgtEl>
+                </p:cond>
+              </p:nextCondLst>
+            </p:seq>
+          </p:childTnLst>
+        </p:cTn>
+      </p:par>
+    </p:tnLst>
+    <p:bldLst>
+      <p:bldP spid="31" grpId="0" animBg="1"/>
+    </p:bldLst>
+  </p:timing>
 </p:sld>
 </file>
 
@@ -6580,6 +6997,13 @@
   <p:clrMapOvr>
     <a:masterClrMapping/>
   </p:clrMapOvr>
+  <p:timing>
+    <p:tnLst>
+      <p:par>
+        <p:cTn id="1" dur="indefinite" restart="never" nodeType="tmRoot"/>
+      </p:par>
+    </p:tnLst>
+  </p:timing>
 </p:sld>
 </file>
 
@@ -6792,7 +7216,6 @@
               <a:rPr lang="en-US" sz="2000" baseline="-25000" dirty="0"/>
               <a:t>DD</a:t>
             </a:r>
-            <a:endParaRPr lang="en-US" sz="2000" baseline="-25000" dirty="0"/>
           </a:p>
         </p:txBody>
       </p:sp>
@@ -6977,6 +7400,158 @@
   <p:clrMapOvr>
     <a:masterClrMapping/>
   </p:clrMapOvr>
+  <p:timing>
+    <p:tnLst>
+      <p:par>
+        <p:cTn id="1" dur="indefinite" restart="never" nodeType="tmRoot">
+          <p:childTnLst>
+            <p:seq concurrent="1" nextAc="seek">
+              <p:cTn id="2" dur="indefinite" nodeType="mainSeq">
+                <p:childTnLst>
+                  <p:par>
+                    <p:cTn id="3" fill="hold">
+                      <p:stCondLst>
+                        <p:cond delay="indefinite"/>
+                      </p:stCondLst>
+                      <p:childTnLst>
+                        <p:par>
+                          <p:cTn id="4" fill="hold">
+                            <p:stCondLst>
+                              <p:cond delay="0"/>
+                            </p:stCondLst>
+                            <p:childTnLst>
+                              <p:par>
+                                <p:cTn id="5" presetID="1" presetClass="entr" presetSubtype="0" fill="hold" grpId="0" nodeType="clickEffect">
+                                  <p:stCondLst>
+                                    <p:cond delay="0"/>
+                                  </p:stCondLst>
+                                  <p:childTnLst>
+                                    <p:set>
+                                      <p:cBhvr>
+                                        <p:cTn id="6" dur="1" fill="hold">
+                                          <p:stCondLst>
+                                            <p:cond delay="0"/>
+                                          </p:stCondLst>
+                                        </p:cTn>
+                                        <p:tgtEl>
+                                          <p:spTgt spid="7"/>
+                                        </p:tgtEl>
+                                        <p:attrNameLst>
+                                          <p:attrName>style.visibility</p:attrName>
+                                        </p:attrNameLst>
+                                      </p:cBhvr>
+                                      <p:to>
+                                        <p:strVal val="visible"/>
+                                      </p:to>
+                                    </p:set>
+                                  </p:childTnLst>
+                                </p:cTn>
+                              </p:par>
+                              <p:par>
+                                <p:cTn id="7" presetID="1" presetClass="entr" presetSubtype="0" fill="hold" grpId="0" nodeType="withEffect">
+                                  <p:stCondLst>
+                                    <p:cond delay="0"/>
+                                  </p:stCondLst>
+                                  <p:childTnLst>
+                                    <p:set>
+                                      <p:cBhvr>
+                                        <p:cTn id="8" dur="1" fill="hold">
+                                          <p:stCondLst>
+                                            <p:cond delay="0"/>
+                                          </p:stCondLst>
+                                        </p:cTn>
+                                        <p:tgtEl>
+                                          <p:spTgt spid="6"/>
+                                        </p:tgtEl>
+                                        <p:attrNameLst>
+                                          <p:attrName>style.visibility</p:attrName>
+                                        </p:attrNameLst>
+                                      </p:cBhvr>
+                                      <p:to>
+                                        <p:strVal val="visible"/>
+                                      </p:to>
+                                    </p:set>
+                                  </p:childTnLst>
+                                </p:cTn>
+                              </p:par>
+                            </p:childTnLst>
+                          </p:cTn>
+                        </p:par>
+                      </p:childTnLst>
+                    </p:cTn>
+                  </p:par>
+                  <p:par>
+                    <p:cTn id="9" fill="hold">
+                      <p:stCondLst>
+                        <p:cond delay="indefinite"/>
+                      </p:stCondLst>
+                      <p:childTnLst>
+                        <p:par>
+                          <p:cTn id="10" fill="hold">
+                            <p:stCondLst>
+                              <p:cond delay="0"/>
+                            </p:stCondLst>
+                            <p:childTnLst>
+                              <p:par>
+                                <p:cTn id="11" presetID="1" presetClass="entr" presetSubtype="0" fill="hold" grpId="0" nodeType="clickEffect">
+                                  <p:stCondLst>
+                                    <p:cond delay="0"/>
+                                  </p:stCondLst>
+                                  <p:childTnLst>
+                                    <p:set>
+                                      <p:cBhvr>
+                                        <p:cTn id="12" dur="1" fill="hold">
+                                          <p:stCondLst>
+                                            <p:cond delay="0"/>
+                                          </p:stCondLst>
+                                        </p:cTn>
+                                        <p:tgtEl>
+                                          <p:spTgt spid="8"/>
+                                        </p:tgtEl>
+                                        <p:attrNameLst>
+                                          <p:attrName>style.visibility</p:attrName>
+                                        </p:attrNameLst>
+                                      </p:cBhvr>
+                                      <p:to>
+                                        <p:strVal val="visible"/>
+                                      </p:to>
+                                    </p:set>
+                                  </p:childTnLst>
+                                </p:cTn>
+                              </p:par>
+                            </p:childTnLst>
+                          </p:cTn>
+                        </p:par>
+                      </p:childTnLst>
+                    </p:cTn>
+                  </p:par>
+                </p:childTnLst>
+              </p:cTn>
+              <p:prevCondLst>
+                <p:cond evt="onPrev" delay="0">
+                  <p:tgtEl>
+                    <p:sldTgt/>
+                  </p:tgtEl>
+                </p:cond>
+              </p:prevCondLst>
+              <p:nextCondLst>
+                <p:cond evt="onNext" delay="0">
+                  <p:tgtEl>
+                    <p:sldTgt/>
+                  </p:tgtEl>
+                </p:cond>
+              </p:nextCondLst>
+            </p:seq>
+          </p:childTnLst>
+        </p:cTn>
+      </p:par>
+    </p:tnLst>
+    <p:bldLst>
+      <p:bldP spid="6" grpId="0" animBg="1"/>
+      <p:bldP spid="7" grpId="0" animBg="1"/>
+      <p:bldP spid="8" grpId="0" animBg="1"/>
+    </p:bldLst>
+  </p:timing>
 </p:sld>
 </file>
 
@@ -7278,6 +7853,13 @@
   <p:clrMapOvr>
     <a:masterClrMapping/>
   </p:clrMapOvr>
+  <p:timing>
+    <p:tnLst>
+      <p:par>
+        <p:cTn id="1" dur="indefinite" restart="never" nodeType="tmRoot"/>
+      </p:par>
+    </p:tnLst>
+  </p:timing>
 </p:sld>
 </file>
 
@@ -7440,6 +8022,13 @@
   <p:clrMapOvr>
     <a:masterClrMapping/>
   </p:clrMapOvr>
+  <p:timing>
+    <p:tnLst>
+      <p:par>
+        <p:cTn id="1" dur="indefinite" restart="never" nodeType="tmRoot"/>
+      </p:par>
+    </p:tnLst>
+  </p:timing>
 </p:sld>
 </file>
 

</xml_diff>